<commit_message>
Präsentation hinzugefügt und upgedatet
</commit_message>
<xml_diff>
--- a/Präsentation/Observer Pattern.pptx
+++ b/Präsentation/Observer Pattern.pptx
@@ -4059,7 +4059,7 @@
         <p:spPr>
           <a:xfrm>
             <a:off x="1920121" y="1654896"/>
-            <a:ext cx="7134121" cy="3139321"/>
+            <a:ext cx="7134121" cy="3970318"/>
           </a:xfrm>
           <a:prstGeom prst="rect">
             <a:avLst/>
@@ -4096,11 +4096,21 @@
             </a:r>
             <a:r>
               <a:rPr lang="de-AT" dirty="0" smtClean="0"/>
-              <a:t> Anwendungen wie zum Beispiel das vorherige Projekt verwendet das </a:t>
-            </a:r>
-            <a:r>
-              <a:rPr lang="de-AT" smtClean="0"/>
-              <a:t>Observer Pattern.</a:t>
+              <a:t> Anwendungen wie zum Beispiel das vorherige Projekt verwendet das Observer Pattern.</a:t>
+            </a:r>
+          </a:p>
+          <a:p>
+            <a:r>
+              <a:rPr lang="en-US" b="1" dirty="0"/>
+              <a:t>import </a:t>
+            </a:r>
+            <a:r>
+              <a:rPr lang="en-US" b="1" dirty="0" err="1"/>
+              <a:t>javafx.collections.ObservableList</a:t>
+            </a:r>
+            <a:r>
+              <a:rPr lang="en-US" b="1" dirty="0"/>
+              <a:t>;</a:t>
             </a:r>
             <a:endParaRPr lang="de-AT" dirty="0" smtClean="0"/>
           </a:p>
@@ -4114,11 +4124,11 @@
             </a:r>
             <a:r>
               <a:rPr lang="de-AT" dirty="0" err="1" smtClean="0"/>
-              <a:t>ArrayList</a:t>
+              <a:t>Observerliste</a:t>
             </a:r>
             <a:r>
               <a:rPr lang="de-AT" dirty="0" smtClean="0"/>
-              <a:t>&lt;Observer&gt;.</a:t>
+              <a:t>&lt;das zu beobachtende Subjekt&gt; welches an die Beobachter weitergegeben wird, wenn es sich verändert hat.</a:t>
             </a:r>
           </a:p>
           <a:p>

</xml_diff>